<commit_message>
Plladium small test env
</commit_message>
<xml_diff>
--- a/Simulation Acceleration tutoria.pptx
+++ b/Simulation Acceleration tutoria.pptx
@@ -336,7 +336,7 @@
               <a:pPr>
                 <a:defRPr/>
               </a:pPr>
-              <a:t>1/3/2015</a:t>
+              <a:t>1/4/2015</a:t>
             </a:fld>
             <a:endParaRPr lang="en-US"/>
           </a:p>
@@ -528,7 +528,7 @@
               <a:pPr>
                 <a:defRPr/>
               </a:pPr>
-              <a:t>1/3/2015</a:t>
+              <a:t>1/4/2015</a:t>
             </a:fld>
             <a:endParaRPr lang="en-US"/>
           </a:p>
@@ -730,7 +730,7 @@
               <a:pPr>
                 <a:defRPr/>
               </a:pPr>
-              <a:t>1/3/2015</a:t>
+              <a:t>1/4/2015</a:t>
             </a:fld>
             <a:endParaRPr lang="en-US"/>
           </a:p>
@@ -922,7 +922,7 @@
               <a:pPr>
                 <a:defRPr/>
               </a:pPr>
-              <a:t>1/3/2015</a:t>
+              <a:t>1/4/2015</a:t>
             </a:fld>
             <a:endParaRPr lang="en-US"/>
           </a:p>
@@ -1190,7 +1190,7 @@
               <a:pPr>
                 <a:defRPr/>
               </a:pPr>
-              <a:t>1/3/2015</a:t>
+              <a:t>1/4/2015</a:t>
             </a:fld>
             <a:endParaRPr lang="en-US"/>
           </a:p>
@@ -1500,7 +1500,7 @@
               <a:pPr>
                 <a:defRPr/>
               </a:pPr>
-              <a:t>1/3/2015</a:t>
+              <a:t>1/4/2015</a:t>
             </a:fld>
             <a:endParaRPr lang="en-US"/>
           </a:p>
@@ -1944,7 +1944,7 @@
               <a:pPr>
                 <a:defRPr/>
               </a:pPr>
-              <a:t>1/3/2015</a:t>
+              <a:t>1/4/2015</a:t>
             </a:fld>
             <a:endParaRPr lang="en-US"/>
           </a:p>
@@ -2084,7 +2084,7 @@
               <a:pPr>
                 <a:defRPr/>
               </a:pPr>
-              <a:t>1/3/2015</a:t>
+              <a:t>1/4/2015</a:t>
             </a:fld>
             <a:endParaRPr lang="en-US"/>
           </a:p>
@@ -2201,7 +2201,7 @@
               <a:pPr>
                 <a:defRPr/>
               </a:pPr>
-              <a:t>1/3/2015</a:t>
+              <a:t>1/4/2015</a:t>
             </a:fld>
             <a:endParaRPr lang="en-US"/>
           </a:p>
@@ -2500,7 +2500,7 @@
               <a:pPr>
                 <a:defRPr/>
               </a:pPr>
-              <a:t>1/3/2015</a:t>
+              <a:t>1/4/2015</a:t>
             </a:fld>
             <a:endParaRPr lang="en-US"/>
           </a:p>
@@ -2778,7 +2778,7 @@
               <a:pPr>
                 <a:defRPr/>
               </a:pPr>
-              <a:t>1/3/2015</a:t>
+              <a:t>1/4/2015</a:t>
             </a:fld>
             <a:endParaRPr lang="en-US"/>
           </a:p>
@@ -3034,7 +3034,7 @@
               <a:pPr>
                 <a:defRPr/>
               </a:pPr>
-              <a:t>1/3/2015</a:t>
+              <a:t>1/4/2015</a:t>
             </a:fld>
             <a:endParaRPr lang="en-US"/>
           </a:p>
@@ -3809,51 +3809,67 @@
           <a:p>
             <a:pPr eaLnBrk="1" hangingPunct="1"/>
             <a:r>
-              <a:rPr lang="en-US" sz="2000" smtClean="0"/>
+              <a:rPr lang="en-US" sz="2000" dirty="0" smtClean="0"/>
               <a:t>A module that we want to run on the Palladium have to first work on regular simulation. Also we need to have this simulation so we’ll knew how this module supposed to work, so when it doesn’t work this way the problem can only come from the difference between the simulation and the Palladium.</a:t>
             </a:r>
           </a:p>
           <a:p>
             <a:pPr eaLnBrk="1" hangingPunct="1"/>
             <a:r>
-              <a:rPr lang="en-US" sz="2000" smtClean="0"/>
+              <a:rPr lang="en-US" sz="2000" dirty="0" smtClean="0"/>
               <a:t>The main problems expected are: </a:t>
             </a:r>
           </a:p>
           <a:p>
             <a:pPr lvl="1" eaLnBrk="1" hangingPunct="1"/>
             <a:r>
-              <a:rPr lang="en-US" sz="1800" smtClean="0"/>
-              <a:t>Clocks: the clocks in the Palladium are generated by special clock generators. We have to knew how many clocks we have in the design, what are their frequencies, and how they are running in the design. </a:t>
+              <a:rPr lang="en-US" sz="1800" b="1" u="sng" dirty="0" smtClean="0"/>
+              <a:t>Clocks:</a:t>
+            </a:r>
+            <a:r>
+              <a:rPr lang="en-US" sz="1800" dirty="0" smtClean="0"/>
+              <a:t> the clocks in the Palladium are generated by special clock generators. We have to knew how many clocks we have in the design, what are their frequencies, and how they are running in the design. </a:t>
             </a:r>
           </a:p>
           <a:p>
             <a:pPr lvl="1" eaLnBrk="1" hangingPunct="1"/>
             <a:r>
-              <a:rPr lang="en-US" sz="1800" smtClean="0"/>
-              <a:t>Clock gates: some times we have clock gates in the design. Sometimes we get those block from the FUB and they are not synthesizable. We need to check them, and if needed replace them with a synthesizable module.</a:t>
+              <a:rPr lang="en-US" sz="1800" b="1" u="sng" dirty="0" smtClean="0"/>
+              <a:t>Clock gates: </a:t>
+            </a:r>
+            <a:r>
+              <a:rPr lang="en-US" sz="1800" dirty="0" smtClean="0"/>
+              <a:t>some times we have clock gates in the design. Sometimes we get those block from the FUB and they are not synthesizable. We need to check them, and if needed replace them with a synthesizable module.</a:t>
             </a:r>
           </a:p>
           <a:p>
             <a:pPr lvl="1" eaLnBrk="1" hangingPunct="1"/>
             <a:r>
-              <a:rPr lang="en-US" sz="1800" smtClean="0"/>
-              <a:t>RAM’s : The RAM’s module used in simulation are Verilog modules provided by the FUB </a:t>
-            </a:r>
-            <a:r>
-              <a:rPr lang="en-US" sz="1800" b="1" u="sng" smtClean="0"/>
+              <a:rPr lang="en-US" sz="1800" b="1" u="sng" dirty="0" smtClean="0"/>
+              <a:t>RAM’s :</a:t>
+            </a:r>
+            <a:r>
+              <a:rPr lang="en-US" sz="1800" dirty="0" smtClean="0"/>
+              <a:t> The RAM’s module used in simulation are Verilog modules provided by the FUB </a:t>
+            </a:r>
+            <a:r>
+              <a:rPr lang="en-US" sz="1800" b="1" u="sng" dirty="0" smtClean="0"/>
               <a:t>they are not synthesizable! </a:t>
             </a:r>
             <a:r>
-              <a:rPr lang="en-US" sz="1800" smtClean="0"/>
+              <a:rPr lang="en-US" sz="1800" dirty="0" smtClean="0"/>
               <a:t>We need to replace them with synthesizable module. </a:t>
             </a:r>
           </a:p>
           <a:p>
             <a:pPr lvl="1" eaLnBrk="1" hangingPunct="1"/>
             <a:r>
-              <a:rPr lang="en-US" sz="1800" smtClean="0"/>
-              <a:t>Analog modules: most of the times those are behavioral modules that again can’t by synthesize. We need to replace them with synthesizable modules or bypass them. </a:t>
+              <a:rPr lang="en-US" sz="1800" b="1" u="sng" dirty="0" smtClean="0"/>
+              <a:t>Analog modules: </a:t>
+            </a:r>
+            <a:r>
+              <a:rPr lang="en-US" sz="1800" dirty="0" smtClean="0"/>
+              <a:t>most of the times those are behavioral modules that again can’t by synthesize. We need to replace them with synthesizable modules or bypass them. </a:t>
             </a:r>
           </a:p>
         </p:txBody>
@@ -3947,36 +3963,124 @@
           <a:p>
             <a:pPr eaLnBrk="1" hangingPunct="1"/>
             <a:r>
-              <a:rPr lang="en-US" sz="2000" smtClean="0"/>
-              <a:t>The Specman environment will need to get some changes to run on the Palladium. But the top level must stay the same so the test running on the Palladium will be identical to the tests running on the ‘official’ simulation.</a:t>
+              <a:rPr lang="en-US" sz="2000" dirty="0" smtClean="0"/>
+              <a:t>The </a:t>
+            </a:r>
+            <a:r>
+              <a:rPr lang="en-US" sz="2000" dirty="0" err="1" smtClean="0"/>
+              <a:t>Specman</a:t>
+            </a:r>
+            <a:r>
+              <a:rPr lang="en-US" sz="2000" dirty="0" smtClean="0"/>
+              <a:t> environment will need to get some changes to run on the Palladium. But the top level must stay the same so the test running on the Palladium will be identical to the tests running on the ‘official’ simulation.</a:t>
             </a:r>
           </a:p>
           <a:p>
             <a:pPr eaLnBrk="1" hangingPunct="1"/>
             <a:r>
-              <a:rPr lang="en-US" sz="2000" smtClean="0"/>
-              <a:t>The main changes need to by done on the Specman envirnonmen are:</a:t>
+              <a:rPr lang="en-US" sz="2000" dirty="0" smtClean="0"/>
+              <a:t>The main changes need to by done on the </a:t>
+            </a:r>
+            <a:r>
+              <a:rPr lang="en-US" sz="2000" dirty="0" err="1" smtClean="0"/>
+              <a:t>Specman</a:t>
+            </a:r>
+            <a:r>
+              <a:rPr lang="en-US" sz="2000" dirty="0" smtClean="0"/>
+              <a:t> </a:t>
+            </a:r>
+            <a:r>
+              <a:rPr lang="en-US" sz="2000" dirty="0" err="1" smtClean="0"/>
+              <a:t>environmen</a:t>
+            </a:r>
+            <a:r>
+              <a:rPr lang="en-US" sz="2000" dirty="0" smtClean="0"/>
+              <a:t> </a:t>
+            </a:r>
+            <a:r>
+              <a:rPr lang="en-US" sz="2000" dirty="0" smtClean="0"/>
+              <a:t>are:</a:t>
             </a:r>
           </a:p>
           <a:p>
             <a:pPr lvl="1" eaLnBrk="1" hangingPunct="1"/>
             <a:r>
-              <a:rPr lang="en-US" sz="1800" smtClean="0"/>
-              <a:t>Events: Specman environment are working from an event to event. In regular Specman environment we can use as much events as we like and as often as we like. So we some time us event even on the clock signal. In the Palladium the Palladium have to stop for each event transfer control to the UNIX for the Specman method and start running again. This will make the simulation very slow almost the speed of regular simulation. So in Palladium SA we need to consider every event we use and use only the major ones.</a:t>
+              <a:rPr lang="en-US" sz="1800" b="1" u="sng" dirty="0" smtClean="0"/>
+              <a:t>Events:</a:t>
+            </a:r>
+            <a:r>
+              <a:rPr lang="en-US" sz="1800" dirty="0" smtClean="0"/>
+              <a:t> </a:t>
+            </a:r>
+            <a:r>
+              <a:rPr lang="en-US" sz="1800" dirty="0" err="1" smtClean="0"/>
+              <a:t>Specman</a:t>
+            </a:r>
+            <a:r>
+              <a:rPr lang="en-US" sz="1800" dirty="0" smtClean="0"/>
+              <a:t> environment are working from an event to event. In regular </a:t>
+            </a:r>
+            <a:r>
+              <a:rPr lang="en-US" sz="1800" dirty="0" err="1" smtClean="0"/>
+              <a:t>Specman</a:t>
+            </a:r>
+            <a:r>
+              <a:rPr lang="en-US" sz="1800" dirty="0" smtClean="0"/>
+              <a:t> environment we can use as much events as we like and as often as we like. So we some time us event even on the clock signal. In the Palladium the Palladium have to stop for each event transfer control to the UNIX for the </a:t>
+            </a:r>
+            <a:r>
+              <a:rPr lang="en-US" sz="1800" dirty="0" err="1" smtClean="0"/>
+              <a:t>Specman</a:t>
+            </a:r>
+            <a:r>
+              <a:rPr lang="en-US" sz="1800" dirty="0" smtClean="0"/>
+              <a:t> method and start running again. This will make the simulation very slow almost the speed of regular simulation. So in Palladium SA we need to consider every event we use and use only the major ones.</a:t>
             </a:r>
           </a:p>
           <a:p>
             <a:pPr lvl="1" eaLnBrk="1" hangingPunct="1"/>
             <a:r>
-              <a:rPr lang="en-US" sz="1800" smtClean="0"/>
-              <a:t>Signals: In regular Specman environment we have no limitation on signals we can use or read in the design. In Palladium every domain have only a number of signal that can be used for this we again need to consider which ones we can us and which we can do without. But we can use a Verilog module in the Palladium to replace the signals we can’t use in the environment.</a:t>
+              <a:rPr lang="en-US" sz="1800" b="1" u="sng" dirty="0" smtClean="0"/>
+              <a:t>Signals:</a:t>
+            </a:r>
+            <a:r>
+              <a:rPr lang="en-US" sz="1800" dirty="0" smtClean="0"/>
+              <a:t> In regular </a:t>
+            </a:r>
+            <a:r>
+              <a:rPr lang="en-US" sz="1800" dirty="0" err="1" smtClean="0"/>
+              <a:t>Specman</a:t>
+            </a:r>
+            <a:r>
+              <a:rPr lang="en-US" sz="1800" dirty="0" smtClean="0"/>
+              <a:t> environment we have no limitation on signals we can use or read in the design. In Palladium every domain have only a number of signal that can be used for this we again need to consider which ones we can us and which we can do without. But we can use a Verilog module in the Palladium to replace the signals we can’t use in the environment.</a:t>
             </a:r>
           </a:p>
           <a:p>
             <a:pPr lvl="1" eaLnBrk="1" hangingPunct="1"/>
             <a:r>
-              <a:rPr lang="en-US" sz="1800" smtClean="0"/>
-              <a:t>Memories: we can’t read or write memories in the design with the specman at all (not enough signals). So reading &amp; writing form the Palladium by the Specman must be done through the UNIX environment. </a:t>
+              <a:rPr lang="en-US" sz="1800" b="1" u="sng" dirty="0" smtClean="0"/>
+              <a:t>Memories: </a:t>
+            </a:r>
+            <a:r>
+              <a:rPr lang="en-US" sz="1800" dirty="0" smtClean="0"/>
+              <a:t>we can’t read or write memories in the design with the </a:t>
+            </a:r>
+            <a:r>
+              <a:rPr lang="en-US" sz="1800" dirty="0" err="1" smtClean="0"/>
+              <a:t>specman</a:t>
+            </a:r>
+            <a:r>
+              <a:rPr lang="en-US" sz="1800" dirty="0" smtClean="0"/>
+              <a:t> at all (not enough signals). So reading &amp; writing form the Palladium by the </a:t>
+            </a:r>
+            <a:r>
+              <a:rPr lang="en-US" sz="1800" dirty="0" err="1" smtClean="0"/>
+              <a:t>Specman</a:t>
+            </a:r>
+            <a:r>
+              <a:rPr lang="en-US" sz="1800" dirty="0" smtClean="0"/>
+              <a:t> must be done through the UNIX environment. </a:t>
             </a:r>
           </a:p>
         </p:txBody>

</xml_diff>